<commit_message>
Update to completed lessons 9 and 10 *but still needs images*
</commit_message>
<xml_diff>
--- a/Lesson 10/Debugging, Refactoring, and more.pptx
+++ b/Lesson 10/Debugging, Refactoring, and more.pptx
@@ -5,21 +5,22 @@
     <p:sldMasterId id="2147483648" r:id="rId1"/>
   </p:sldMasterIdLst>
   <p:notesMasterIdLst>
-    <p:notesMasterId r:id="rId14"/>
+    <p:notesMasterId r:id="rId15"/>
   </p:notesMasterIdLst>
   <p:sldIdLst>
     <p:sldId id="256" r:id="rId2"/>
     <p:sldId id="257" r:id="rId3"/>
-    <p:sldId id="258" r:id="rId4"/>
-    <p:sldId id="259" r:id="rId5"/>
-    <p:sldId id="260" r:id="rId6"/>
-    <p:sldId id="261" r:id="rId7"/>
+    <p:sldId id="268" r:id="rId4"/>
+    <p:sldId id="258" r:id="rId5"/>
+    <p:sldId id="259" r:id="rId6"/>
+    <p:sldId id="260" r:id="rId7"/>
     <p:sldId id="262" r:id="rId8"/>
-    <p:sldId id="263" r:id="rId9"/>
-    <p:sldId id="264" r:id="rId10"/>
-    <p:sldId id="265" r:id="rId11"/>
-    <p:sldId id="266" r:id="rId12"/>
-    <p:sldId id="267" r:id="rId13"/>
+    <p:sldId id="261" r:id="rId9"/>
+    <p:sldId id="263" r:id="rId10"/>
+    <p:sldId id="264" r:id="rId11"/>
+    <p:sldId id="265" r:id="rId12"/>
+    <p:sldId id="266" r:id="rId13"/>
+    <p:sldId id="267" r:id="rId14"/>
   </p:sldIdLst>
   <p:sldSz cx="9144000" cy="6858000" type="screen4x3"/>
   <p:notesSz cx="6858000" cy="9144000"/>
@@ -203,7 +204,7 @@
           <a:p>
             <a:fld id="{4AAF5A05-E65B-4952-9AD3-B4552CF0586F}" type="datetimeFigureOut">
               <a:rPr lang="en-US" smtClean="0"/>
-              <a:t>8/27/2013</a:t>
+              <a:t>8/28/2013</a:t>
             </a:fld>
             <a:endParaRPr lang="en-US"/>
           </a:p>
@@ -566,7 +567,7 @@
           <a:p>
             <a:fld id="{A4D54E42-F95B-49AF-AABA-5CBE07BD39AE}" type="slidenum">
               <a:rPr lang="en-US" smtClean="0"/>
-              <a:t>3</a:t>
+              <a:t>4</a:t>
             </a:fld>
             <a:endParaRPr lang="en-US"/>
           </a:p>
@@ -576,6 +577,94 @@
     <p:extLst>
       <p:ext uri="{BB962C8B-B14F-4D97-AF65-F5344CB8AC3E}">
         <p14:creationId xmlns:p14="http://schemas.microsoft.com/office/powerpoint/2010/main" val="2118863816"/>
+      </p:ext>
+    </p:extLst>
+  </p:cSld>
+  <p:clrMapOvr>
+    <a:masterClrMapping/>
+  </p:clrMapOvr>
+</p:notes>
+</file>
+
+<file path=ppt/notesSlides/notesSlide2.xml><?xml version="1.0" encoding="utf-8"?>
+<p:notes xmlns:a="http://schemas.openxmlformats.org/drawingml/2006/main" xmlns:r="http://schemas.openxmlformats.org/officeDocument/2006/relationships" xmlns:p="http://schemas.openxmlformats.org/presentationml/2006/main">
+  <p:cSld>
+    <p:spTree>
+      <p:nvGrpSpPr>
+        <p:cNvPr id="1" name=""/>
+        <p:cNvGrpSpPr/>
+        <p:nvPr/>
+      </p:nvGrpSpPr>
+      <p:grpSpPr>
+        <a:xfrm>
+          <a:off x="0" y="0"/>
+          <a:ext cx="0" cy="0"/>
+          <a:chOff x="0" y="0"/>
+          <a:chExt cx="0" cy="0"/>
+        </a:xfrm>
+      </p:grpSpPr>
+      <p:sp>
+        <p:nvSpPr>
+          <p:cNvPr id="2" name="Slide Image Placeholder 1"/>
+          <p:cNvSpPr>
+            <a:spLocks noGrp="1" noRot="1" noChangeAspect="1"/>
+          </p:cNvSpPr>
+          <p:nvPr>
+            <p:ph type="sldImg"/>
+          </p:nvPr>
+        </p:nvSpPr>
+        <p:spPr/>
+      </p:sp>
+      <p:sp>
+        <p:nvSpPr>
+          <p:cNvPr id="3" name="Notes Placeholder 2"/>
+          <p:cNvSpPr>
+            <a:spLocks noGrp="1"/>
+          </p:cNvSpPr>
+          <p:nvPr>
+            <p:ph type="body" idx="1"/>
+          </p:nvPr>
+        </p:nvSpPr>
+        <p:spPr/>
+        <p:txBody>
+          <a:bodyPr/>
+          <a:lstStyle/>
+          <a:p>
+            <a:r>
+              <a:rPr lang="en-US" dirty="0" smtClean="0"/>
+              <a:t>Instructor: Use the “this” examples from before</a:t>
+            </a:r>
+            <a:endParaRPr lang="en-US" dirty="0"/>
+          </a:p>
+        </p:txBody>
+      </p:sp>
+      <p:sp>
+        <p:nvSpPr>
+          <p:cNvPr id="4" name="Slide Number Placeholder 3"/>
+          <p:cNvSpPr>
+            <a:spLocks noGrp="1"/>
+          </p:cNvSpPr>
+          <p:nvPr>
+            <p:ph type="sldNum" sz="quarter" idx="10"/>
+          </p:nvPr>
+        </p:nvSpPr>
+        <p:spPr/>
+        <p:txBody>
+          <a:bodyPr/>
+          <a:lstStyle/>
+          <a:p>
+            <a:fld id="{A4D54E42-F95B-49AF-AABA-5CBE07BD39AE}" type="slidenum">
+              <a:rPr lang="en-US" smtClean="0"/>
+              <a:t>12</a:t>
+            </a:fld>
+            <a:endParaRPr lang="en-US"/>
+          </a:p>
+        </p:txBody>
+      </p:sp>
+    </p:spTree>
+    <p:extLst>
+      <p:ext uri="{BB962C8B-B14F-4D97-AF65-F5344CB8AC3E}">
+        <p14:creationId xmlns:p14="http://schemas.microsoft.com/office/powerpoint/2010/main" val="52488665"/>
       </p:ext>
     </p:extLst>
   </p:cSld>
@@ -766,7 +855,7 @@
           <a:p>
             <a:fld id="{71021D4B-CD1E-4DC3-84F6-9E4E1148EB8C}" type="datetimeFigureOut">
               <a:rPr lang="en-US" smtClean="0"/>
-              <a:t>8/27/2013</a:t>
+              <a:t>8/28/2013</a:t>
             </a:fld>
             <a:endParaRPr lang="en-US"/>
           </a:p>
@@ -936,7 +1025,7 @@
           <a:p>
             <a:fld id="{71021D4B-CD1E-4DC3-84F6-9E4E1148EB8C}" type="datetimeFigureOut">
               <a:rPr lang="en-US" smtClean="0"/>
-              <a:t>8/27/2013</a:t>
+              <a:t>8/28/2013</a:t>
             </a:fld>
             <a:endParaRPr lang="en-US"/>
           </a:p>
@@ -1116,7 +1205,7 @@
           <a:p>
             <a:fld id="{71021D4B-CD1E-4DC3-84F6-9E4E1148EB8C}" type="datetimeFigureOut">
               <a:rPr lang="en-US" smtClean="0"/>
-              <a:t>8/27/2013</a:t>
+              <a:t>8/28/2013</a:t>
             </a:fld>
             <a:endParaRPr lang="en-US"/>
           </a:p>
@@ -1286,7 +1375,7 @@
           <a:p>
             <a:fld id="{71021D4B-CD1E-4DC3-84F6-9E4E1148EB8C}" type="datetimeFigureOut">
               <a:rPr lang="en-US" smtClean="0"/>
-              <a:t>8/27/2013</a:t>
+              <a:t>8/28/2013</a:t>
             </a:fld>
             <a:endParaRPr lang="en-US"/>
           </a:p>
@@ -1532,7 +1621,7 @@
           <a:p>
             <a:fld id="{71021D4B-CD1E-4DC3-84F6-9E4E1148EB8C}" type="datetimeFigureOut">
               <a:rPr lang="en-US" smtClean="0"/>
-              <a:t>8/27/2013</a:t>
+              <a:t>8/28/2013</a:t>
             </a:fld>
             <a:endParaRPr lang="en-US"/>
           </a:p>
@@ -1820,7 +1909,7 @@
           <a:p>
             <a:fld id="{71021D4B-CD1E-4DC3-84F6-9E4E1148EB8C}" type="datetimeFigureOut">
               <a:rPr lang="en-US" smtClean="0"/>
-              <a:t>8/27/2013</a:t>
+              <a:t>8/28/2013</a:t>
             </a:fld>
             <a:endParaRPr lang="en-US"/>
           </a:p>
@@ -2242,7 +2331,7 @@
           <a:p>
             <a:fld id="{71021D4B-CD1E-4DC3-84F6-9E4E1148EB8C}" type="datetimeFigureOut">
               <a:rPr lang="en-US" smtClean="0"/>
-              <a:t>8/27/2013</a:t>
+              <a:t>8/28/2013</a:t>
             </a:fld>
             <a:endParaRPr lang="en-US"/>
           </a:p>
@@ -2360,7 +2449,7 @@
           <a:p>
             <a:fld id="{71021D4B-CD1E-4DC3-84F6-9E4E1148EB8C}" type="datetimeFigureOut">
               <a:rPr lang="en-US" smtClean="0"/>
-              <a:t>8/27/2013</a:t>
+              <a:t>8/28/2013</a:t>
             </a:fld>
             <a:endParaRPr lang="en-US"/>
           </a:p>
@@ -2455,7 +2544,7 @@
           <a:p>
             <a:fld id="{71021D4B-CD1E-4DC3-84F6-9E4E1148EB8C}" type="datetimeFigureOut">
               <a:rPr lang="en-US" smtClean="0"/>
-              <a:t>8/27/2013</a:t>
+              <a:t>8/28/2013</a:t>
             </a:fld>
             <a:endParaRPr lang="en-US"/>
           </a:p>
@@ -2732,7 +2821,7 @@
           <a:p>
             <a:fld id="{71021D4B-CD1E-4DC3-84F6-9E4E1148EB8C}" type="datetimeFigureOut">
               <a:rPr lang="en-US" smtClean="0"/>
-              <a:t>8/27/2013</a:t>
+              <a:t>8/28/2013</a:t>
             </a:fld>
             <a:endParaRPr lang="en-US"/>
           </a:p>
@@ -2985,7 +3074,7 @@
           <a:p>
             <a:fld id="{71021D4B-CD1E-4DC3-84F6-9E4E1148EB8C}" type="datetimeFigureOut">
               <a:rPr lang="en-US" smtClean="0"/>
-              <a:t>8/27/2013</a:t>
+              <a:t>8/28/2013</a:t>
             </a:fld>
             <a:endParaRPr lang="en-US"/>
           </a:p>
@@ -3198,7 +3287,7 @@
           <a:p>
             <a:fld id="{71021D4B-CD1E-4DC3-84F6-9E4E1148EB8C}" type="datetimeFigureOut">
               <a:rPr lang="en-US" smtClean="0"/>
-              <a:t>8/27/2013</a:t>
+              <a:t>8/28/2013</a:t>
             </a:fld>
             <a:endParaRPr lang="en-US"/>
           </a:p>
@@ -3590,7 +3679,11 @@
           <a:p>
             <a:r>
               <a:rPr lang="en-US" dirty="0" smtClean="0"/>
-              <a:t>Debugging, Refactoring, and more</a:t>
+              <a:t>Debugging, Refactoring, </a:t>
+            </a:r>
+            <a:r>
+              <a:rPr lang="en-US" dirty="0" smtClean="0"/>
+              <a:t>Switch Blocks, and This</a:t>
             </a:r>
             <a:endParaRPr lang="en-US" dirty="0"/>
           </a:p>
@@ -3662,7 +3755,7 @@
           <a:p>
             <a:r>
               <a:rPr lang="en-US" dirty="0" smtClean="0"/>
-              <a:t>Debugging: Level Two</a:t>
+              <a:t>Debugging: Level One</a:t>
             </a:r>
             <a:endParaRPr lang="en-US" dirty="0"/>
           </a:p>
@@ -3687,119 +3780,96 @@
           <a:p>
             <a:r>
               <a:rPr lang="en-US" dirty="0" smtClean="0"/>
-              <a:t>So no red errors but not getting the right answer?</a:t>
-            </a:r>
-          </a:p>
-          <a:p>
-            <a:r>
-              <a:rPr lang="en-US" dirty="0" smtClean="0"/>
-              <a:t>Try console.log</a:t>
+              <a:t>Check </a:t>
+            </a:r>
+            <a:r>
+              <a:rPr lang="en-US" dirty="0"/>
+              <a:t>for errors </a:t>
+            </a:r>
+            <a:r>
+              <a:rPr lang="en-US" dirty="0" smtClean="0"/>
+              <a:t>(red text, aligned right) </a:t>
+            </a:r>
+            <a:r>
+              <a:rPr lang="en-US" dirty="0"/>
+              <a:t>in </a:t>
+            </a:r>
+            <a:r>
+              <a:rPr lang="en-US" dirty="0" smtClean="0"/>
+              <a:t>console</a:t>
             </a:r>
           </a:p>
           <a:p>
             <a:pPr lvl="1"/>
             <a:r>
-              <a:rPr lang="en-US" dirty="0" smtClean="0"/>
-              <a:t>Ex: </a:t>
-            </a:r>
-          </a:p>
-          <a:p>
-            <a:pPr marL="457200" lvl="1" indent="0">
-              <a:buNone/>
-            </a:pPr>
-            <a:r>
-              <a:rPr lang="en-US" dirty="0" err="1" smtClean="0"/>
-              <a:t>var</a:t>
-            </a:r>
-            <a:r>
-              <a:rPr lang="en-US" dirty="0" smtClean="0"/>
-              <a:t> </a:t>
-            </a:r>
-            <a:r>
-              <a:rPr lang="en-US" dirty="0" err="1" smtClean="0"/>
-              <a:t>stringOfNames</a:t>
-            </a:r>
-            <a:r>
-              <a:rPr lang="en-US" dirty="0" smtClean="0"/>
-              <a:t>=“”;</a:t>
+              <a:rPr lang="en-US" dirty="0"/>
+              <a:t>To access debugging console</a:t>
+            </a:r>
+          </a:p>
+          <a:p>
+            <a:pPr lvl="2"/>
+            <a:r>
+              <a:rPr lang="en-US" dirty="0"/>
+              <a:t>PC: CTRL+SHIFT+J</a:t>
+            </a:r>
+          </a:p>
+          <a:p>
+            <a:pPr lvl="2"/>
+            <a:r>
+              <a:rPr lang="en-US" dirty="0"/>
+              <a:t>Mac: </a:t>
+            </a:r>
+            <a:r>
+              <a:rPr lang="en-US" dirty="0" smtClean="0"/>
+              <a:t>COMMAND+OPTION+J</a:t>
             </a:r>
             <a:endParaRPr lang="en-US" dirty="0"/>
           </a:p>
           <a:p>
-            <a:pPr marL="457200" lvl="1" indent="0">
-              <a:buNone/>
-            </a:pPr>
-            <a:r>
-              <a:rPr lang="en-US" dirty="0" smtClean="0"/>
-              <a:t>[“</a:t>
-            </a:r>
-            <a:r>
-              <a:rPr lang="en-US" dirty="0" err="1" smtClean="0"/>
-              <a:t>Bob”,”Joe</a:t>
-            </a:r>
-            <a:r>
-              <a:rPr lang="en-US" dirty="0" smtClean="0"/>
-              <a:t>”].</a:t>
-            </a:r>
-            <a:r>
-              <a:rPr lang="en-US" dirty="0" err="1" smtClean="0"/>
-              <a:t>forEach</a:t>
-            </a:r>
-            <a:r>
-              <a:rPr lang="en-US" dirty="0" smtClean="0"/>
-              <a:t>(function(element){</a:t>
-            </a:r>
-          </a:p>
-          <a:p>
-            <a:pPr marL="457200" lvl="1" indent="0">
-              <a:buNone/>
-            </a:pPr>
-            <a:r>
-              <a:rPr lang="en-US" dirty="0" smtClean="0"/>
-              <a:t>	</a:t>
-            </a:r>
-            <a:r>
-              <a:rPr lang="en-US" dirty="0" err="1" smtClean="0"/>
-              <a:t>stringOfNames</a:t>
-            </a:r>
-            <a:r>
-              <a:rPr lang="en-US" dirty="0" smtClean="0"/>
-              <a:t>-=element+”,”;</a:t>
-            </a:r>
-          </a:p>
-          <a:p>
-            <a:pPr marL="457200" lvl="1" indent="0">
-              <a:buNone/>
-            </a:pPr>
-            <a:r>
-              <a:rPr lang="en-US" dirty="0" smtClean="0"/>
-              <a:t>	console.log(</a:t>
-            </a:r>
-            <a:r>
-              <a:rPr lang="en-US" dirty="0" err="1" smtClean="0"/>
-              <a:t>stringOfNames</a:t>
-            </a:r>
-            <a:r>
-              <a:rPr lang="en-US" dirty="0" smtClean="0"/>
-              <a:t>);</a:t>
-            </a:r>
+            <a:r>
+              <a:rPr lang="en-US" dirty="0"/>
+              <a:t>Click the </a:t>
+            </a:r>
+            <a:r>
+              <a:rPr lang="en-US" dirty="0" smtClean="0"/>
+              <a:t>error</a:t>
+            </a:r>
+          </a:p>
+          <a:p>
+            <a:pPr lvl="1"/>
+            <a:r>
+              <a:rPr lang="en-US" dirty="0" smtClean="0"/>
+              <a:t>Goes to where computer thinks error is</a:t>
+            </a:r>
+            <a:endParaRPr lang="en-US" dirty="0" smtClean="0"/>
+          </a:p>
+          <a:p>
+            <a:pPr lvl="1"/>
+            <a:r>
+              <a:rPr lang="en-US" dirty="0" smtClean="0"/>
+              <a:t>The </a:t>
+            </a:r>
+            <a:r>
+              <a:rPr lang="en-US" dirty="0"/>
+              <a:t>location may not be correct but is a good place to start</a:t>
+            </a:r>
+          </a:p>
+          <a:p>
+            <a:pPr lvl="2"/>
+            <a:r>
+              <a:rPr lang="en-US" dirty="0"/>
+              <a:t>Ex: Unbalanced brackets or parentheses</a:t>
+            </a:r>
+          </a:p>
+          <a:p>
             <a:endParaRPr lang="en-US" dirty="0"/>
-          </a:p>
-          <a:p>
-            <a:pPr marL="457200" lvl="1" indent="0">
-              <a:buNone/>
-            </a:pPr>
-            <a:r>
-              <a:rPr lang="en-US" dirty="0" smtClean="0"/>
-              <a:t>});</a:t>
-            </a:r>
           </a:p>
         </p:txBody>
       </p:sp>
     </p:spTree>
     <p:extLst>
       <p:ext uri="{BB962C8B-B14F-4D97-AF65-F5344CB8AC3E}">
-        <p14:creationId xmlns:p14="http://schemas.microsoft.com/office/powerpoint/2010/main" val="1587272920"/>
+        <p14:creationId xmlns:p14="http://schemas.microsoft.com/office/powerpoint/2010/main" val="2684947582"/>
       </p:ext>
     </p:extLst>
   </p:cSld>
@@ -3843,6 +3913,187 @@
           <a:p>
             <a:r>
               <a:rPr lang="en-US" dirty="0" smtClean="0"/>
+              <a:t>Debugging: Level Two</a:t>
+            </a:r>
+            <a:endParaRPr lang="en-US" dirty="0"/>
+          </a:p>
+        </p:txBody>
+      </p:sp>
+      <p:sp>
+        <p:nvSpPr>
+          <p:cNvPr id="3" name="Content Placeholder 2"/>
+          <p:cNvSpPr>
+            <a:spLocks noGrp="1"/>
+          </p:cNvSpPr>
+          <p:nvPr>
+            <p:ph idx="1"/>
+          </p:nvPr>
+        </p:nvSpPr>
+        <p:spPr/>
+        <p:txBody>
+          <a:bodyPr>
+            <a:normAutofit lnSpcReduction="10000"/>
+          </a:bodyPr>
+          <a:lstStyle/>
+          <a:p>
+            <a:r>
+              <a:rPr lang="en-US" dirty="0" smtClean="0"/>
+              <a:t>So no red errors but not getting the right answer?</a:t>
+            </a:r>
+          </a:p>
+          <a:p>
+            <a:r>
+              <a:rPr lang="en-US" dirty="0" smtClean="0"/>
+              <a:t>Try console.log</a:t>
+            </a:r>
+          </a:p>
+          <a:p>
+            <a:pPr lvl="1"/>
+            <a:r>
+              <a:rPr lang="en-US" dirty="0" smtClean="0"/>
+              <a:t>Ex: </a:t>
+            </a:r>
+          </a:p>
+          <a:p>
+            <a:pPr marL="457200" lvl="1" indent="0">
+              <a:buNone/>
+            </a:pPr>
+            <a:r>
+              <a:rPr lang="en-US" dirty="0" err="1" smtClean="0"/>
+              <a:t>var</a:t>
+            </a:r>
+            <a:r>
+              <a:rPr lang="en-US" dirty="0" smtClean="0"/>
+              <a:t> </a:t>
+            </a:r>
+            <a:r>
+              <a:rPr lang="en-US" dirty="0" err="1" smtClean="0"/>
+              <a:t>stringOfNames</a:t>
+            </a:r>
+            <a:r>
+              <a:rPr lang="en-US" dirty="0" smtClean="0"/>
+              <a:t>=“”;</a:t>
+            </a:r>
+            <a:endParaRPr lang="en-US" dirty="0"/>
+          </a:p>
+          <a:p>
+            <a:pPr marL="457200" lvl="1" indent="0">
+              <a:buNone/>
+            </a:pPr>
+            <a:r>
+              <a:rPr lang="en-US" dirty="0" smtClean="0"/>
+              <a:t>[“</a:t>
+            </a:r>
+            <a:r>
+              <a:rPr lang="en-US" dirty="0" err="1" smtClean="0"/>
+              <a:t>Bob”,”Joe</a:t>
+            </a:r>
+            <a:r>
+              <a:rPr lang="en-US" dirty="0" smtClean="0"/>
+              <a:t>”].</a:t>
+            </a:r>
+            <a:r>
+              <a:rPr lang="en-US" dirty="0" err="1" smtClean="0"/>
+              <a:t>forEach</a:t>
+            </a:r>
+            <a:r>
+              <a:rPr lang="en-US" dirty="0" smtClean="0"/>
+              <a:t>(function(element){</a:t>
+            </a:r>
+          </a:p>
+          <a:p>
+            <a:pPr marL="457200" lvl="1" indent="0">
+              <a:buNone/>
+            </a:pPr>
+            <a:r>
+              <a:rPr lang="en-US" dirty="0" smtClean="0"/>
+              <a:t>	</a:t>
+            </a:r>
+            <a:r>
+              <a:rPr lang="en-US" dirty="0" err="1" smtClean="0"/>
+              <a:t>stringOfNames</a:t>
+            </a:r>
+            <a:r>
+              <a:rPr lang="en-US" dirty="0" smtClean="0"/>
+              <a:t>-=element+”,”;</a:t>
+            </a:r>
+          </a:p>
+          <a:p>
+            <a:pPr marL="457200" lvl="1" indent="0">
+              <a:buNone/>
+            </a:pPr>
+            <a:r>
+              <a:rPr lang="en-US" dirty="0" smtClean="0"/>
+              <a:t>	console.log(</a:t>
+            </a:r>
+            <a:r>
+              <a:rPr lang="en-US" dirty="0" err="1" smtClean="0"/>
+              <a:t>stringOfNames</a:t>
+            </a:r>
+            <a:r>
+              <a:rPr lang="en-US" dirty="0" smtClean="0"/>
+              <a:t>);</a:t>
+            </a:r>
+            <a:endParaRPr lang="en-US" dirty="0"/>
+          </a:p>
+          <a:p>
+            <a:pPr marL="457200" lvl="1" indent="0">
+              <a:buNone/>
+            </a:pPr>
+            <a:r>
+              <a:rPr lang="en-US" dirty="0" smtClean="0"/>
+              <a:t>});</a:t>
+            </a:r>
+          </a:p>
+        </p:txBody>
+      </p:sp>
+    </p:spTree>
+    <p:extLst>
+      <p:ext uri="{BB962C8B-B14F-4D97-AF65-F5344CB8AC3E}">
+        <p14:creationId xmlns:p14="http://schemas.microsoft.com/office/powerpoint/2010/main" val="1587272920"/>
+      </p:ext>
+    </p:extLst>
+  </p:cSld>
+  <p:clrMapOvr>
+    <a:masterClrMapping/>
+  </p:clrMapOvr>
+</p:sld>
+</file>
+
+<file path=ppt/slides/slide12.xml><?xml version="1.0" encoding="utf-8"?>
+<p:sld xmlns:a="http://schemas.openxmlformats.org/drawingml/2006/main" xmlns:r="http://schemas.openxmlformats.org/officeDocument/2006/relationships" xmlns:p="http://schemas.openxmlformats.org/presentationml/2006/main">
+  <p:cSld>
+    <p:spTree>
+      <p:nvGrpSpPr>
+        <p:cNvPr id="1" name=""/>
+        <p:cNvGrpSpPr/>
+        <p:nvPr/>
+      </p:nvGrpSpPr>
+      <p:grpSpPr>
+        <a:xfrm>
+          <a:off x="0" y="0"/>
+          <a:ext cx="0" cy="0"/>
+          <a:chOff x="0" y="0"/>
+          <a:chExt cx="0" cy="0"/>
+        </a:xfrm>
+      </p:grpSpPr>
+      <p:sp>
+        <p:nvSpPr>
+          <p:cNvPr id="2" name="Title 1"/>
+          <p:cNvSpPr>
+            <a:spLocks noGrp="1"/>
+          </p:cNvSpPr>
+          <p:nvPr>
+            <p:ph type="title"/>
+          </p:nvPr>
+        </p:nvSpPr>
+        <p:spPr/>
+        <p:txBody>
+          <a:bodyPr/>
+          <a:lstStyle/>
+          <a:p>
+            <a:r>
+              <a:rPr lang="en-US" dirty="0" smtClean="0"/>
               <a:t>Debugging: Level Three</a:t>
             </a:r>
             <a:endParaRPr lang="en-US" dirty="0"/>
@@ -3915,7 +4166,7 @@
 </p:sld>
 </file>
 
-<file path=ppt/slides/slide12.xml><?xml version="1.0" encoding="utf-8"?>
+<file path=ppt/slides/slide13.xml><?xml version="1.0" encoding="utf-8"?>
 <p:sld xmlns:a="http://schemas.openxmlformats.org/drawingml/2006/main" xmlns:r="http://schemas.openxmlformats.org/officeDocument/2006/relationships" xmlns:p="http://schemas.openxmlformats.org/presentationml/2006/main">
   <p:cSld>
     <p:spTree>
@@ -4066,7 +4317,12 @@
             <p:ph type="body" idx="1"/>
           </p:nvPr>
         </p:nvSpPr>
-        <p:spPr/>
+        <p:spPr>
+          <a:xfrm>
+            <a:off x="457200" y="1219200"/>
+            <a:ext cx="4040188" cy="639762"/>
+          </a:xfrm>
+        </p:spPr>
         <p:txBody>
           <a:bodyPr/>
           <a:lstStyle/>
@@ -4088,10 +4344,15 @@
             <p:ph sz="half" idx="2"/>
           </p:nvPr>
         </p:nvSpPr>
-        <p:spPr/>
+        <p:spPr>
+          <a:xfrm>
+            <a:off x="457200" y="1905000"/>
+            <a:ext cx="4040188" cy="4724399"/>
+          </a:xfrm>
+        </p:spPr>
         <p:txBody>
           <a:bodyPr>
-            <a:normAutofit lnSpcReduction="10000"/>
+            <a:normAutofit fontScale="92500" lnSpcReduction="10000"/>
           </a:bodyPr>
           <a:lstStyle/>
           <a:p>
@@ -4181,6 +4442,34 @@
               <a:t>}</a:t>
             </a:r>
           </a:p>
+          <a:p>
+            <a:pPr marL="0" indent="0">
+              <a:buNone/>
+            </a:pPr>
+            <a:r>
+              <a:rPr lang="en-US" dirty="0" smtClean="0"/>
+              <a:t>else{</a:t>
+            </a:r>
+          </a:p>
+          <a:p>
+            <a:pPr marL="0" indent="0">
+              <a:buNone/>
+            </a:pPr>
+            <a:r>
+              <a:rPr lang="en-US" dirty="0" smtClean="0"/>
+              <a:t>   gender=false;</a:t>
+            </a:r>
+          </a:p>
+          <a:p>
+            <a:pPr marL="0" indent="0">
+              <a:buNone/>
+            </a:pPr>
+            <a:r>
+              <a:rPr lang="en-US" dirty="0"/>
+              <a:t>}</a:t>
+            </a:r>
+            <a:endParaRPr lang="en-US" dirty="0" smtClean="0"/>
+          </a:p>
         </p:txBody>
       </p:sp>
       <p:sp>
@@ -4191,40 +4480,45 @@
           </p:cNvSpPr>
           <p:nvPr>
             <p:ph type="body" sz="quarter" idx="3"/>
-          </p:nvPr>
-        </p:nvSpPr>
-        <p:spPr/>
-        <p:txBody>
-          <a:bodyPr/>
-          <a:lstStyle/>
-          <a:p>
-            <a:r>
-              <a:rPr lang="en-US" dirty="0" smtClean="0"/>
-              <a:t>New method</a:t>
-            </a:r>
-            <a:endParaRPr lang="en-US" dirty="0"/>
-          </a:p>
-        </p:txBody>
-      </p:sp>
-      <p:sp>
-        <p:nvSpPr>
-          <p:cNvPr id="8" name="Content Placeholder 7"/>
-          <p:cNvSpPr>
-            <a:spLocks noGrp="1"/>
-          </p:cNvSpPr>
-          <p:nvPr>
-            <p:ph sz="quarter" idx="4"/>
           </p:nvPr>
         </p:nvSpPr>
         <p:spPr>
           <a:xfrm>
-            <a:off x="3886200" y="2174875"/>
-            <a:ext cx="5105400" cy="3951288"/>
+            <a:off x="4645025" y="1189038"/>
+            <a:ext cx="4041775" cy="639762"/>
           </a:xfrm>
         </p:spPr>
         <p:txBody>
+          <a:bodyPr/>
+          <a:lstStyle/>
+          <a:p>
+            <a:r>
+              <a:rPr lang="en-US" dirty="0" smtClean="0"/>
+              <a:t>New method</a:t>
+            </a:r>
+            <a:endParaRPr lang="en-US" dirty="0"/>
+          </a:p>
+        </p:txBody>
+      </p:sp>
+      <p:sp>
+        <p:nvSpPr>
+          <p:cNvPr id="8" name="Content Placeholder 7"/>
+          <p:cNvSpPr>
+            <a:spLocks noGrp="1"/>
+          </p:cNvSpPr>
+          <p:nvPr>
+            <p:ph sz="quarter" idx="4"/>
+          </p:nvPr>
+        </p:nvSpPr>
+        <p:spPr>
+          <a:xfrm>
+            <a:off x="3886200" y="1828800"/>
+            <a:ext cx="5105400" cy="4297363"/>
+          </a:xfrm>
+        </p:spPr>
+        <p:txBody>
           <a:bodyPr>
-            <a:normAutofit lnSpcReduction="10000"/>
+            <a:normAutofit/>
           </a:bodyPr>
           <a:lstStyle/>
           <a:p>
@@ -4379,7 +4673,7 @@
           <a:p>
             <a:r>
               <a:rPr lang="en-US" dirty="0" smtClean="0"/>
-              <a:t>Keyword: This</a:t>
+              <a:t>Examples</a:t>
             </a:r>
             <a:endParaRPr lang="en-US" dirty="0"/>
           </a:p>
@@ -4397,94 +4691,49 @@
         </p:nvSpPr>
         <p:spPr/>
         <p:txBody>
-          <a:bodyPr>
-            <a:normAutofit fontScale="92500" lnSpcReduction="20000"/>
-          </a:bodyPr>
-          <a:lstStyle/>
-          <a:p>
-            <a:r>
-              <a:rPr lang="en-US" dirty="0" err="1" smtClean="0"/>
-              <a:t>jQuery</a:t>
-            </a:r>
-            <a:r>
-              <a:rPr lang="en-US" dirty="0" smtClean="0"/>
-              <a:t>: “this” refers to the selected object</a:t>
+          <a:bodyPr/>
+          <a:lstStyle/>
+          <a:p>
+            <a:r>
+              <a:rPr lang="en-US" dirty="0" smtClean="0"/>
+              <a:t>Allow users to change site theme</a:t>
+            </a:r>
+          </a:p>
+          <a:p>
+            <a:r>
+              <a:rPr lang="en-US" dirty="0" smtClean="0"/>
+              <a:t>JS Game</a:t>
             </a:r>
           </a:p>
           <a:p>
             <a:pPr lvl="1"/>
             <a:r>
               <a:rPr lang="en-US" dirty="0" smtClean="0"/>
-              <a:t>Ex: $(“#container”).animate({opacity:0},</a:t>
-            </a:r>
-          </a:p>
-          <a:p>
-            <a:pPr marL="457200" lvl="1" indent="0">
+              <a:t>Switch with cases for arrow up, down, left, right</a:t>
+            </a:r>
+          </a:p>
+          <a:p>
+            <a:r>
+              <a:rPr lang="en-US" dirty="0" smtClean="0"/>
+              <a:t>Handling server response codes</a:t>
+            </a:r>
+          </a:p>
+          <a:p>
+            <a:pPr marL="0" indent="0">
               <a:buNone/>
             </a:pPr>
-            <a:r>
-              <a:rPr lang="en-US" dirty="0" smtClean="0"/>
-              <a:t>                                              5000,</a:t>
-            </a:r>
-          </a:p>
-          <a:p>
-            <a:pPr marL="457200" lvl="1" indent="0">
+            <a:endParaRPr lang="en-US" dirty="0"/>
+          </a:p>
+          <a:p>
+            <a:pPr marL="0" indent="0">
               <a:buNone/>
             </a:pPr>
             <a:r>
-              <a:rPr lang="en-US" dirty="0" smtClean="0"/>
-              <a:t>                                              function(){</a:t>
-            </a:r>
-          </a:p>
-          <a:p>
-            <a:pPr marL="457200" lvl="1" indent="0">
-              <a:buNone/>
-            </a:pPr>
-            <a:r>
-              <a:rPr lang="en-US" dirty="0" smtClean="0"/>
-              <a:t>                                                   $(this).</a:t>
-            </a:r>
-            <a:r>
-              <a:rPr lang="en-US" dirty="0" err="1" smtClean="0"/>
-              <a:t>css</a:t>
-            </a:r>
-            <a:r>
-              <a:rPr lang="en-US" dirty="0" smtClean="0"/>
-              <a:t>({opacity:1});</a:t>
-            </a:r>
-          </a:p>
-          <a:p>
-            <a:pPr marL="457200" lvl="1" indent="0">
-              <a:buNone/>
-            </a:pPr>
-            <a:r>
-              <a:rPr lang="en-US" dirty="0" smtClean="0"/>
-              <a:t>                                              });</a:t>
-            </a:r>
-          </a:p>
-          <a:p>
-            <a:r>
-              <a:rPr lang="en-US" dirty="0" smtClean="0"/>
-              <a:t>What does this bit of code do?</a:t>
-            </a:r>
-          </a:p>
-          <a:p>
-            <a:pPr marL="457200" lvl="1" indent="0">
-              <a:buNone/>
-            </a:pPr>
-            <a:endParaRPr lang="en-US" dirty="0" smtClean="0"/>
-          </a:p>
-          <a:p>
-            <a:endParaRPr lang="en-US" dirty="0" smtClean="0"/>
-          </a:p>
-          <a:p>
-            <a:pPr marL="457200" lvl="1" indent="0">
-              <a:buNone/>
-            </a:pPr>
-            <a:r>
-              <a:rPr lang="en-US" dirty="0" smtClean="0"/>
-              <a:t>   </a:t>
-            </a:r>
+              <a:rPr lang="en-US" b="1" dirty="0" smtClean="0"/>
+              <a:t>*Instructor add your own*</a:t>
+            </a:r>
+          </a:p>
+          <a:p>
             <a:endParaRPr lang="en-US" dirty="0"/>
           </a:p>
         </p:txBody>
@@ -4492,7 +4741,7 @@
     </p:spTree>
     <p:extLst>
       <p:ext uri="{BB962C8B-B14F-4D97-AF65-F5344CB8AC3E}">
-        <p14:creationId xmlns:p14="http://schemas.microsoft.com/office/powerpoint/2010/main" val="1444297961"/>
+        <p14:creationId xmlns:p14="http://schemas.microsoft.com/office/powerpoint/2010/main" val="1469737782"/>
       </p:ext>
     </p:extLst>
   </p:cSld>
@@ -4544,7 +4793,7 @@
       </p:sp>
       <p:sp>
         <p:nvSpPr>
-          <p:cNvPr id="3" name="Content Placeholder 2"/>
+          <p:cNvPr id="7" name="Content Placeholder 6"/>
           <p:cNvSpPr>
             <a:spLocks noGrp="1"/>
           </p:cNvSpPr>
@@ -4554,82 +4803,102 @@
         </p:nvSpPr>
         <p:spPr/>
         <p:txBody>
-          <a:bodyPr/>
-          <a:lstStyle/>
-          <a:p>
-            <a:pPr marL="0" indent="0">
+          <a:bodyPr>
+            <a:normAutofit fontScale="92500" lnSpcReduction="20000"/>
+          </a:bodyPr>
+          <a:lstStyle/>
+          <a:p>
+            <a:r>
+              <a:rPr lang="en-US" dirty="0" err="1" smtClean="0"/>
+              <a:t>jQuery</a:t>
+            </a:r>
+            <a:r>
+              <a:rPr lang="en-US" dirty="0" smtClean="0"/>
+              <a:t>: “this” refers to the selected object</a:t>
+            </a:r>
+          </a:p>
+          <a:p>
+            <a:pPr lvl="1"/>
+            <a:r>
+              <a:rPr lang="en-US" dirty="0" smtClean="0"/>
+              <a:t>Ex: $(“#container”).animate({opacity:0},</a:t>
+            </a:r>
+          </a:p>
+          <a:p>
+            <a:pPr marL="457200" lvl="1" indent="0">
               <a:buNone/>
             </a:pPr>
             <a:r>
               <a:rPr lang="en-US" dirty="0" smtClean="0"/>
-              <a:t>How about this code?</a:t>
-            </a:r>
-          </a:p>
-          <a:p>
-            <a:pPr marL="0" indent="0">
+              <a:t>                                              5000,</a:t>
+            </a:r>
+          </a:p>
+          <a:p>
+            <a:pPr marL="457200" lvl="1" indent="0">
               <a:buNone/>
             </a:pPr>
             <a:r>
               <a:rPr lang="en-US" dirty="0" smtClean="0"/>
-              <a:t>$(“p”).on(“</a:t>
+              <a:t>                                              function(){</a:t>
+            </a:r>
+          </a:p>
+          <a:p>
+            <a:pPr marL="457200" lvl="1" indent="0">
+              <a:buNone/>
+            </a:pPr>
+            <a:r>
+              <a:rPr lang="en-US" dirty="0" smtClean="0"/>
+              <a:t>                                                   $(this).</a:t>
             </a:r>
             <a:r>
               <a:rPr lang="en-US" dirty="0" err="1" smtClean="0"/>
-              <a:t>click”,function</a:t>
-            </a:r>
-            <a:r>
-              <a:rPr lang="en-US" dirty="0" smtClean="0"/>
-              <a:t>(e){</a:t>
-            </a:r>
-          </a:p>
-          <a:p>
-            <a:pPr marL="0" indent="0">
+              <a:t>css</a:t>
+            </a:r>
+            <a:r>
+              <a:rPr lang="en-US" dirty="0" smtClean="0"/>
+              <a:t>({opacity:1});</a:t>
+            </a:r>
+          </a:p>
+          <a:p>
+            <a:pPr marL="457200" lvl="1" indent="0">
               <a:buNone/>
             </a:pPr>
             <a:r>
               <a:rPr lang="en-US" dirty="0" smtClean="0"/>
-              <a:t>    $(this).</a:t>
-            </a:r>
-            <a:r>
-              <a:rPr lang="en-US" dirty="0" err="1" smtClean="0"/>
-              <a:t>fadeOut</a:t>
-            </a:r>
-            <a:r>
-              <a:rPr lang="en-US" dirty="0" smtClean="0"/>
-              <a:t>(500);</a:t>
+              <a:t>                                              });</a:t>
+            </a:r>
+          </a:p>
+          <a:p>
+            <a:r>
+              <a:rPr lang="en-US" dirty="0" smtClean="0"/>
+              <a:t>What does this bit of code do?</a:t>
+            </a:r>
+          </a:p>
+          <a:p>
+            <a:pPr marL="457200" lvl="1" indent="0">
+              <a:buNone/>
+            </a:pPr>
+            <a:endParaRPr lang="en-US" dirty="0" smtClean="0"/>
+          </a:p>
+          <a:p>
+            <a:endParaRPr lang="en-US" dirty="0" smtClean="0"/>
+          </a:p>
+          <a:p>
+            <a:pPr marL="457200" lvl="1" indent="0">
+              <a:buNone/>
+            </a:pPr>
+            <a:r>
+              <a:rPr lang="en-US" dirty="0" smtClean="0"/>
+              <a:t>   </a:t>
             </a:r>
             <a:endParaRPr lang="en-US" dirty="0"/>
-          </a:p>
-          <a:p>
-            <a:pPr marL="0" indent="0">
-              <a:buNone/>
-            </a:pPr>
-            <a:r>
-              <a:rPr lang="en-US" dirty="0" smtClean="0"/>
-              <a:t>});</a:t>
-            </a:r>
-          </a:p>
-          <a:p>
-            <a:pPr marL="0" indent="0">
-              <a:buNone/>
-            </a:pPr>
-            <a:endParaRPr lang="en-US" dirty="0"/>
-          </a:p>
-          <a:p>
-            <a:pPr marL="0" indent="0">
-              <a:buNone/>
-            </a:pPr>
-            <a:r>
-              <a:rPr lang="en-US" dirty="0" smtClean="0"/>
-              <a:t>Rule of thumb (ROT): If I don’t know what thing will be acted on, then I should consider using “this”</a:t>
-            </a:r>
           </a:p>
         </p:txBody>
       </p:sp>
     </p:spTree>
     <p:extLst>
       <p:ext uri="{BB962C8B-B14F-4D97-AF65-F5344CB8AC3E}">
-        <p14:creationId xmlns:p14="http://schemas.microsoft.com/office/powerpoint/2010/main" val="3640521056"/>
+        <p14:creationId xmlns:p14="http://schemas.microsoft.com/office/powerpoint/2010/main" val="1444297961"/>
       </p:ext>
     </p:extLst>
   </p:cSld>
@@ -4673,7 +4942,7 @@
           <a:p>
             <a:r>
               <a:rPr lang="en-US" dirty="0" smtClean="0"/>
-              <a:t>Refactoring</a:t>
+              <a:t>Keyword: This</a:t>
             </a:r>
             <a:endParaRPr lang="en-US" dirty="0"/>
           </a:p>
@@ -4691,50 +4960,82 @@
         </p:nvSpPr>
         <p:spPr/>
         <p:txBody>
-          <a:bodyPr>
-            <a:normAutofit/>
-          </a:bodyPr>
-          <a:lstStyle/>
-          <a:p>
-            <a:r>
-              <a:rPr lang="en-US" dirty="0" smtClean="0"/>
-              <a:t>The process of rewriting code without changing functionality</a:t>
-            </a:r>
-          </a:p>
-          <a:p>
-            <a:pPr lvl="1"/>
-            <a:r>
-              <a:rPr lang="en-US" dirty="0" smtClean="0"/>
-              <a:t>To reduce or eliminate redundancy</a:t>
-            </a:r>
-          </a:p>
-          <a:p>
-            <a:pPr lvl="1"/>
-            <a:r>
-              <a:rPr lang="en-US" dirty="0" smtClean="0"/>
-              <a:t>Make code easier to read</a:t>
-            </a:r>
-          </a:p>
-          <a:p>
-            <a:pPr lvl="1"/>
-            <a:r>
-              <a:rPr lang="en-US" dirty="0" smtClean="0"/>
-              <a:t>Make code more maintainable</a:t>
-            </a:r>
-            <a:endParaRPr lang="en-US" dirty="0" smtClean="0"/>
+          <a:bodyPr/>
+          <a:lstStyle/>
+          <a:p>
+            <a:pPr marL="0" indent="0">
+              <a:buNone/>
+            </a:pPr>
+            <a:r>
+              <a:rPr lang="en-US" dirty="0" smtClean="0"/>
+              <a:t>How about this code?</a:t>
+            </a:r>
+          </a:p>
+          <a:p>
+            <a:pPr marL="0" indent="0">
+              <a:buNone/>
+            </a:pPr>
+            <a:r>
+              <a:rPr lang="en-US" dirty="0" smtClean="0"/>
+              <a:t>$(“p”).on(“</a:t>
+            </a:r>
+            <a:r>
+              <a:rPr lang="en-US" dirty="0" err="1" smtClean="0"/>
+              <a:t>click”,function</a:t>
+            </a:r>
+            <a:r>
+              <a:rPr lang="en-US" dirty="0" smtClean="0"/>
+              <a:t>(e){</a:t>
+            </a:r>
+          </a:p>
+          <a:p>
+            <a:pPr marL="0" indent="0">
+              <a:buNone/>
+            </a:pPr>
+            <a:r>
+              <a:rPr lang="en-US" dirty="0" smtClean="0"/>
+              <a:t>    $(this).</a:t>
+            </a:r>
+            <a:r>
+              <a:rPr lang="en-US" dirty="0" err="1" smtClean="0"/>
+              <a:t>fadeOut</a:t>
+            </a:r>
+            <a:r>
+              <a:rPr lang="en-US" dirty="0" smtClean="0"/>
+              <a:t>(500);</a:t>
+            </a:r>
+            <a:endParaRPr lang="en-US" dirty="0"/>
+          </a:p>
+          <a:p>
+            <a:pPr marL="0" indent="0">
+              <a:buNone/>
+            </a:pPr>
+            <a:r>
+              <a:rPr lang="en-US" dirty="0" smtClean="0"/>
+              <a:t>});</a:t>
+            </a:r>
           </a:p>
           <a:p>
             <a:pPr marL="0" indent="0">
               <a:buNone/>
             </a:pPr>
             <a:endParaRPr lang="en-US" dirty="0"/>
+          </a:p>
+          <a:p>
+            <a:pPr marL="0" indent="0">
+              <a:buNone/>
+            </a:pPr>
+            <a:r>
+              <a:rPr lang="en-US" dirty="0" smtClean="0"/>
+              <a:t>Rule of thumb (ROT): If I don’t know what thing will be acted on, then I should consider using “this”</a:t>
+            </a:r>
           </a:p>
         </p:txBody>
       </p:sp>
     </p:spTree>
     <p:extLst>
       <p:ext uri="{BB962C8B-B14F-4D97-AF65-F5344CB8AC3E}">
-        <p14:creationId xmlns:p14="http://schemas.microsoft.com/office/powerpoint/2010/main" val="2883787349"/>
+        <p14:creationId xmlns:p14="http://schemas.microsoft.com/office/powerpoint/2010/main" val="3640521056"/>
       </p:ext>
     </p:extLst>
   </p:cSld>
@@ -4778,7 +5079,7 @@
           <a:p>
             <a:r>
               <a:rPr lang="en-US" dirty="0" smtClean="0"/>
-              <a:t>JS Refactoring</a:t>
+              <a:t>Refactoring</a:t>
             </a:r>
             <a:endParaRPr lang="en-US" dirty="0"/>
           </a:p>
@@ -4796,106 +5097,41 @@
         </p:nvSpPr>
         <p:spPr/>
         <p:txBody>
-          <a:bodyPr/>
-          <a:lstStyle/>
-          <a:p>
-            <a:r>
-              <a:rPr lang="en-US" dirty="0" smtClean="0"/>
-              <a:t>Use </a:t>
-            </a:r>
-            <a:r>
-              <a:rPr lang="en-US" dirty="0"/>
-              <a:t>functions</a:t>
-            </a:r>
-          </a:p>
-          <a:p>
-            <a:r>
-              <a:rPr lang="en-US" dirty="0"/>
-              <a:t>Use </a:t>
-            </a:r>
-            <a:r>
-              <a:rPr lang="en-US" dirty="0" smtClean="0"/>
-              <a:t>variables</a:t>
-            </a:r>
-          </a:p>
-          <a:p>
-            <a:r>
-              <a:rPr lang="en-US" dirty="0"/>
-              <a:t>Combine </a:t>
-            </a:r>
-            <a:r>
-              <a:rPr lang="en-US" dirty="0" err="1"/>
-              <a:t>jQuery</a:t>
-            </a:r>
-            <a:r>
-              <a:rPr lang="en-US" dirty="0"/>
-              <a:t> selectors</a:t>
-            </a:r>
-          </a:p>
-          <a:p>
-            <a:r>
-              <a:rPr lang="en-US" dirty="0"/>
-              <a:t>Combine </a:t>
-            </a:r>
-            <a:r>
-              <a:rPr lang="en-US" dirty="0" err="1"/>
-              <a:t>jQuery</a:t>
-            </a:r>
-            <a:r>
-              <a:rPr lang="en-US" dirty="0"/>
-              <a:t> property changes into </a:t>
-            </a:r>
-            <a:r>
-              <a:rPr lang="en-US" dirty="0" smtClean="0"/>
-              <a:t>objects</a:t>
+          <a:bodyPr>
+            <a:normAutofit/>
+          </a:bodyPr>
+          <a:lstStyle/>
+          <a:p>
+            <a:r>
+              <a:rPr lang="en-US" dirty="0" smtClean="0"/>
+              <a:t>The process of rewriting code without changing functionality</a:t>
             </a:r>
           </a:p>
           <a:p>
             <a:pPr lvl="1"/>
             <a:r>
               <a:rPr lang="en-US" dirty="0" smtClean="0"/>
-              <a:t>.</a:t>
-            </a:r>
-            <a:r>
-              <a:rPr lang="en-US" dirty="0" err="1" smtClean="0"/>
-              <a:t>css</a:t>
-            </a:r>
-            <a:r>
-              <a:rPr lang="en-US" dirty="0" smtClean="0"/>
-              <a:t>,.</a:t>
-            </a:r>
-            <a:r>
-              <a:rPr lang="en-US" dirty="0" err="1" smtClean="0"/>
-              <a:t>attr,etc</a:t>
-            </a:r>
-            <a:endParaRPr lang="en-US" dirty="0" smtClean="0"/>
-          </a:p>
-          <a:p>
-            <a:r>
-              <a:rPr lang="en-US" dirty="0" smtClean="0"/>
-              <a:t>Chain </a:t>
-            </a:r>
-            <a:r>
-              <a:rPr lang="en-US" dirty="0" err="1" smtClean="0"/>
-              <a:t>jQuery</a:t>
-            </a:r>
-            <a:r>
-              <a:rPr lang="en-US" dirty="0"/>
-              <a:t> </a:t>
-            </a:r>
-            <a:r>
-              <a:rPr lang="en-US" dirty="0" smtClean="0"/>
-              <a:t>function calls</a:t>
-            </a:r>
-          </a:p>
-          <a:p>
-            <a:r>
-              <a:rPr lang="en-US" dirty="0" smtClean="0"/>
-              <a:t>What can you think of?</a:t>
+              <a:t>To reduce or eliminate redundancy</a:t>
             </a:r>
           </a:p>
           <a:p>
             <a:pPr lvl="1"/>
+            <a:r>
+              <a:rPr lang="en-US" dirty="0" smtClean="0"/>
+              <a:t>Make code easier to read</a:t>
+            </a:r>
+          </a:p>
+          <a:p>
+            <a:pPr lvl="1"/>
+            <a:r>
+              <a:rPr lang="en-US" dirty="0" smtClean="0"/>
+              <a:t>Make code more maintainable</a:t>
+            </a:r>
+          </a:p>
+          <a:p>
+            <a:pPr marL="0" indent="0">
+              <a:buNone/>
+            </a:pPr>
             <a:endParaRPr lang="en-US" dirty="0"/>
           </a:p>
         </p:txBody>
@@ -4903,7 +5139,7 @@
     </p:spTree>
     <p:extLst>
       <p:ext uri="{BB962C8B-B14F-4D97-AF65-F5344CB8AC3E}">
-        <p14:creationId xmlns:p14="http://schemas.microsoft.com/office/powerpoint/2010/main" val="541134955"/>
+        <p14:creationId xmlns:p14="http://schemas.microsoft.com/office/powerpoint/2010/main" val="2883787349"/>
       </p:ext>
     </p:extLst>
   </p:cSld>
@@ -4965,7 +5201,9 @@
         </p:nvSpPr>
         <p:spPr/>
         <p:txBody>
-          <a:bodyPr/>
+          <a:bodyPr>
+            <a:normAutofit fontScale="92500" lnSpcReduction="10000"/>
+          </a:bodyPr>
           <a:lstStyle/>
           <a:p>
             <a:r>
@@ -5008,7 +5246,21 @@
           <a:p>
             <a:r>
               <a:rPr lang="en-US" dirty="0" smtClean="0"/>
-              <a:t>Create classes for large CSS changes in JS</a:t>
+              <a:t>Create classes for large CSS changes in </a:t>
+            </a:r>
+            <a:r>
+              <a:rPr lang="en-US" dirty="0" smtClean="0"/>
+              <a:t>JS</a:t>
+            </a:r>
+          </a:p>
+          <a:p>
+            <a:r>
+              <a:rPr lang="en-US" dirty="0" smtClean="0"/>
+              <a:t>Remove unnecessary </a:t>
+            </a:r>
+            <a:r>
+              <a:rPr lang="en-US" dirty="0" err="1" smtClean="0"/>
+              <a:t>css</a:t>
             </a:r>
             <a:endParaRPr lang="en-US" dirty="0"/>
           </a:p>
@@ -5061,7 +5313,7 @@
           <a:p>
             <a:r>
               <a:rPr lang="en-US" dirty="0" smtClean="0"/>
-              <a:t>Debugging</a:t>
+              <a:t>JS Refactoring</a:t>
             </a:r>
             <a:endParaRPr lang="en-US" dirty="0"/>
           </a:p>
@@ -5080,41 +5332,123 @@
         <p:spPr/>
         <p:txBody>
           <a:bodyPr>
-            <a:normAutofit/>
+            <a:normAutofit lnSpcReduction="10000"/>
           </a:bodyPr>
           <a:lstStyle/>
           <a:p>
             <a:r>
               <a:rPr lang="en-US" dirty="0" smtClean="0"/>
-              <a:t>To access debugging console</a:t>
+              <a:t>Use </a:t>
+            </a:r>
+            <a:r>
+              <a:rPr lang="en-US" dirty="0" smtClean="0"/>
+              <a:t>functions</a:t>
+            </a:r>
+            <a:endParaRPr lang="en-US" dirty="0"/>
+          </a:p>
+          <a:p>
+            <a:r>
+              <a:rPr lang="en-US" dirty="0"/>
+              <a:t>Use </a:t>
+            </a:r>
+            <a:r>
+              <a:rPr lang="en-US" dirty="0" smtClean="0"/>
+              <a:t>variables</a:t>
+            </a:r>
+          </a:p>
+          <a:p>
+            <a:r>
+              <a:rPr lang="en-US" dirty="0" smtClean="0"/>
+              <a:t>Use arrays</a:t>
+            </a:r>
+            <a:endParaRPr lang="en-US" dirty="0" smtClean="0"/>
+          </a:p>
+          <a:p>
+            <a:r>
+              <a:rPr lang="en-US" dirty="0"/>
+              <a:t>Combine </a:t>
+            </a:r>
+            <a:r>
+              <a:rPr lang="en-US" dirty="0" err="1"/>
+              <a:t>jQuery</a:t>
+            </a:r>
+            <a:r>
+              <a:rPr lang="en-US" dirty="0"/>
+              <a:t> selectors</a:t>
+            </a:r>
+          </a:p>
+          <a:p>
+            <a:r>
+              <a:rPr lang="en-US" dirty="0"/>
+              <a:t>Combine </a:t>
+            </a:r>
+            <a:r>
+              <a:rPr lang="en-US" dirty="0" err="1"/>
+              <a:t>jQuery</a:t>
+            </a:r>
+            <a:r>
+              <a:rPr lang="en-US" dirty="0"/>
+              <a:t> property changes into </a:t>
+            </a:r>
+            <a:r>
+              <a:rPr lang="en-US" dirty="0" smtClean="0"/>
+              <a:t>objects</a:t>
             </a:r>
           </a:p>
           <a:p>
             <a:pPr lvl="1"/>
             <a:r>
               <a:rPr lang="en-US" dirty="0" smtClean="0"/>
-              <a:t>PC: CTRL+SHIFT+J</a:t>
+              <a:t>.</a:t>
+            </a:r>
+            <a:r>
+              <a:rPr lang="en-US" dirty="0" err="1" smtClean="0"/>
+              <a:t>css</a:t>
+            </a:r>
+            <a:r>
+              <a:rPr lang="en-US" dirty="0" smtClean="0"/>
+              <a:t>,.</a:t>
+            </a:r>
+            <a:r>
+              <a:rPr lang="en-US" dirty="0" err="1" smtClean="0"/>
+              <a:t>attr,etc</a:t>
+            </a:r>
+            <a:endParaRPr lang="en-US" dirty="0" smtClean="0"/>
+          </a:p>
+          <a:p>
+            <a:r>
+              <a:rPr lang="en-US" dirty="0" smtClean="0"/>
+              <a:t>Chain </a:t>
+            </a:r>
+            <a:r>
+              <a:rPr lang="en-US" dirty="0" err="1" smtClean="0"/>
+              <a:t>jQuery</a:t>
+            </a:r>
+            <a:r>
+              <a:rPr lang="en-US" dirty="0"/>
+              <a:t> </a:t>
+            </a:r>
+            <a:r>
+              <a:rPr lang="en-US" dirty="0" smtClean="0"/>
+              <a:t>function calls</a:t>
+            </a:r>
+          </a:p>
+          <a:p>
+            <a:r>
+              <a:rPr lang="en-US" dirty="0" smtClean="0"/>
+              <a:t>What can you think of?</a:t>
             </a:r>
           </a:p>
           <a:p>
             <a:pPr lvl="1"/>
-            <a:r>
-              <a:rPr lang="en-US" dirty="0" smtClean="0"/>
-              <a:t>Mac: COMMAND+OPTION+J</a:t>
-            </a:r>
-          </a:p>
-          <a:p>
-            <a:r>
-              <a:rPr lang="en-US" dirty="0" smtClean="0"/>
-              <a:t>Allows you to find errors in your code</a:t>
-            </a:r>
+            <a:endParaRPr lang="en-US" dirty="0"/>
           </a:p>
         </p:txBody>
       </p:sp>
     </p:spTree>
     <p:extLst>
       <p:ext uri="{BB962C8B-B14F-4D97-AF65-F5344CB8AC3E}">
-        <p14:creationId xmlns:p14="http://schemas.microsoft.com/office/powerpoint/2010/main" val="715287420"/>
+        <p14:creationId xmlns:p14="http://schemas.microsoft.com/office/powerpoint/2010/main" val="541134955"/>
       </p:ext>
     </p:extLst>
   </p:cSld>
@@ -5158,7 +5492,7 @@
           <a:p>
             <a:r>
               <a:rPr lang="en-US" dirty="0" smtClean="0"/>
-              <a:t>Debugging: Level One</a:t>
+              <a:t>Debugging</a:t>
             </a:r>
             <a:endParaRPr lang="en-US" dirty="0"/>
           </a:p>
@@ -5176,46 +5510,85 @@
         </p:nvSpPr>
         <p:spPr/>
         <p:txBody>
-          <a:bodyPr/>
-          <a:lstStyle/>
-          <a:p>
-            <a:r>
-              <a:rPr lang="en-US" dirty="0" smtClean="0"/>
-              <a:t>Check </a:t>
-            </a:r>
-            <a:r>
-              <a:rPr lang="en-US" dirty="0"/>
-              <a:t>for errors in red in console</a:t>
-            </a:r>
-          </a:p>
-          <a:p>
-            <a:r>
-              <a:rPr lang="en-US" dirty="0"/>
-              <a:t>Click the error location on the right</a:t>
-            </a:r>
-          </a:p>
-          <a:p>
-            <a:r>
-              <a:rPr lang="en-US" dirty="0"/>
-              <a:t>The location may not be correct but is a good place to start</a:t>
+          <a:bodyPr>
+            <a:normAutofit fontScale="92500" lnSpcReduction="20000"/>
+          </a:bodyPr>
+          <a:lstStyle/>
+          <a:p>
+            <a:pPr marL="0" indent="0">
+              <a:buNone/>
+            </a:pPr>
+            <a:r>
+              <a:rPr lang="en-US" dirty="0" smtClean="0"/>
+              <a:t>ALWAYS START BY DEFINING THE PROBLEM</a:t>
+            </a:r>
+          </a:p>
+          <a:p>
+            <a:r>
+              <a:rPr lang="en-US" dirty="0" smtClean="0"/>
+              <a:t>“The image is not moving”</a:t>
+            </a:r>
+          </a:p>
+          <a:p>
+            <a:r>
+              <a:rPr lang="en-US" dirty="0" smtClean="0"/>
+              <a:t>“The appended html is not showing up”</a:t>
+            </a:r>
+          </a:p>
+          <a:p>
+            <a:r>
+              <a:rPr lang="en-US" dirty="0" smtClean="0"/>
+              <a:t>“None of my code works”</a:t>
+            </a:r>
+            <a:endParaRPr lang="en-US" dirty="0"/>
+          </a:p>
+          <a:p>
+            <a:pPr marL="0" indent="0">
+              <a:buNone/>
+            </a:pPr>
+            <a:endParaRPr lang="en-US" dirty="0" smtClean="0"/>
+          </a:p>
+          <a:p>
+            <a:pPr marL="0" indent="0">
+              <a:buNone/>
+            </a:pPr>
+            <a:r>
+              <a:rPr lang="en-US" dirty="0" smtClean="0"/>
+              <a:t>This will tell you where to start your hunt</a:t>
+            </a:r>
+          </a:p>
+          <a:p>
+            <a:r>
+              <a:rPr lang="en-US" dirty="0" smtClean="0"/>
+              <a:t>Image not moving</a:t>
             </a:r>
           </a:p>
           <a:p>
             <a:pPr lvl="1"/>
             <a:r>
-              <a:rPr lang="en-US" dirty="0"/>
-              <a:t>Ex: Unbalanced brackets or parentheses</a:t>
-            </a:r>
-          </a:p>
-          <a:p>
-            <a:endParaRPr lang="en-US" dirty="0"/>
+              <a:rPr lang="en-US" dirty="0" smtClean="0"/>
+              <a:t>find the code that makes the image move</a:t>
+            </a:r>
+          </a:p>
+          <a:p>
+            <a:r>
+              <a:rPr lang="en-US" dirty="0" smtClean="0"/>
+              <a:t>None of my code works</a:t>
+            </a:r>
+          </a:p>
+          <a:p>
+            <a:pPr lvl="1"/>
+            <a:r>
+              <a:rPr lang="en-US" dirty="0" smtClean="0"/>
+              <a:t>Syntax error, check console</a:t>
+            </a:r>
           </a:p>
         </p:txBody>
       </p:sp>
     </p:spTree>
     <p:extLst>
       <p:ext uri="{BB962C8B-B14F-4D97-AF65-F5344CB8AC3E}">
-        <p14:creationId xmlns:p14="http://schemas.microsoft.com/office/powerpoint/2010/main" val="2684947582"/>
+        <p14:creationId xmlns:p14="http://schemas.microsoft.com/office/powerpoint/2010/main" val="715287420"/>
       </p:ext>
     </p:extLst>
   </p:cSld>

</xml_diff>